<commit_message>
111 ihe dcc public comment review (#123)
* DCC Updates 1

Per #111 , this has all the updates except completion of the actor simplification.

* Fixed Broken Reference

Corrected use of an undefined link.

* Updated Simplified Actor Descriptions

Finalized the DCC requested simplified actor descriptions.

* Updated Actor Descriptions & Build Test

Updated actors + reviewing build push effort.

* Completed review and update for Actor Descriptions

Finalized descriptions and ensured consistency between similar actors (e.g., gateway descriptions).
</commit_message>
<xml_diff>
--- a/sources/vol1-diagram-sdpi-a-actor.pptx
+++ b/sources/vol1-diagram-sdpi-a-actor.pptx
@@ -259,7 +259,7 @@
           <a:p>
             <a:fld id="{CEAB79FE-F2B8-4F38-B4B7-E17A89FC2611}" type="datetimeFigureOut">
               <a:rPr lang="en-US" smtClean="0"/>
-              <a:t>2/21/2023</a:t>
+              <a:t>3/31/2023</a:t>
             </a:fld>
             <a:endParaRPr lang="en-US"/>
           </a:p>
@@ -457,7 +457,7 @@
           <a:p>
             <a:fld id="{CEAB79FE-F2B8-4F38-B4B7-E17A89FC2611}" type="datetimeFigureOut">
               <a:rPr lang="en-US" smtClean="0"/>
-              <a:t>2/21/2023</a:t>
+              <a:t>3/31/2023</a:t>
             </a:fld>
             <a:endParaRPr lang="en-US"/>
           </a:p>
@@ -665,7 +665,7 @@
           <a:p>
             <a:fld id="{CEAB79FE-F2B8-4F38-B4B7-E17A89FC2611}" type="datetimeFigureOut">
               <a:rPr lang="en-US" smtClean="0"/>
-              <a:t>2/21/2023</a:t>
+              <a:t>3/31/2023</a:t>
             </a:fld>
             <a:endParaRPr lang="en-US"/>
           </a:p>
@@ -863,7 +863,7 @@
           <a:p>
             <a:fld id="{CEAB79FE-F2B8-4F38-B4B7-E17A89FC2611}" type="datetimeFigureOut">
               <a:rPr lang="en-US" smtClean="0"/>
-              <a:t>2/21/2023</a:t>
+              <a:t>3/31/2023</a:t>
             </a:fld>
             <a:endParaRPr lang="en-US"/>
           </a:p>
@@ -1138,7 +1138,7 @@
           <a:p>
             <a:fld id="{CEAB79FE-F2B8-4F38-B4B7-E17A89FC2611}" type="datetimeFigureOut">
               <a:rPr lang="en-US" smtClean="0"/>
-              <a:t>2/21/2023</a:t>
+              <a:t>3/31/2023</a:t>
             </a:fld>
             <a:endParaRPr lang="en-US"/>
           </a:p>
@@ -1403,7 +1403,7 @@
           <a:p>
             <a:fld id="{CEAB79FE-F2B8-4F38-B4B7-E17A89FC2611}" type="datetimeFigureOut">
               <a:rPr lang="en-US" smtClean="0"/>
-              <a:t>2/21/2023</a:t>
+              <a:t>3/31/2023</a:t>
             </a:fld>
             <a:endParaRPr lang="en-US"/>
           </a:p>
@@ -1815,7 +1815,7 @@
           <a:p>
             <a:fld id="{CEAB79FE-F2B8-4F38-B4B7-E17A89FC2611}" type="datetimeFigureOut">
               <a:rPr lang="en-US" smtClean="0"/>
-              <a:t>2/21/2023</a:t>
+              <a:t>3/31/2023</a:t>
             </a:fld>
             <a:endParaRPr lang="en-US"/>
           </a:p>
@@ -1956,7 +1956,7 @@
           <a:p>
             <a:fld id="{CEAB79FE-F2B8-4F38-B4B7-E17A89FC2611}" type="datetimeFigureOut">
               <a:rPr lang="en-US" smtClean="0"/>
-              <a:t>2/21/2023</a:t>
+              <a:t>3/31/2023</a:t>
             </a:fld>
             <a:endParaRPr lang="en-US"/>
           </a:p>
@@ -2069,7 +2069,7 @@
           <a:p>
             <a:fld id="{CEAB79FE-F2B8-4F38-B4B7-E17A89FC2611}" type="datetimeFigureOut">
               <a:rPr lang="en-US" smtClean="0"/>
-              <a:t>2/21/2023</a:t>
+              <a:t>3/31/2023</a:t>
             </a:fld>
             <a:endParaRPr lang="en-US"/>
           </a:p>
@@ -2380,7 +2380,7 @@
           <a:p>
             <a:fld id="{CEAB79FE-F2B8-4F38-B4B7-E17A89FC2611}" type="datetimeFigureOut">
               <a:rPr lang="en-US" smtClean="0"/>
-              <a:t>2/21/2023</a:t>
+              <a:t>3/31/2023</a:t>
             </a:fld>
             <a:endParaRPr lang="en-US"/>
           </a:p>
@@ -2668,7 +2668,7 @@
           <a:p>
             <a:fld id="{CEAB79FE-F2B8-4F38-B4B7-E17A89FC2611}" type="datetimeFigureOut">
               <a:rPr lang="en-US" smtClean="0"/>
-              <a:t>2/21/2023</a:t>
+              <a:t>3/31/2023</a:t>
             </a:fld>
             <a:endParaRPr lang="en-US"/>
           </a:p>
@@ -2909,7 +2909,7 @@
           <a:p>
             <a:fld id="{CEAB79FE-F2B8-4F38-B4B7-E17A89FC2611}" type="datetimeFigureOut">
               <a:rPr lang="en-US" smtClean="0"/>
-              <a:t>2/21/2023</a:t>
+              <a:t>3/31/2023</a:t>
             </a:fld>
             <a:endParaRPr lang="en-US"/>
           </a:p>
@@ -3849,7 +3849,7 @@
         </p:nvSpPr>
         <p:spPr>
           <a:xfrm>
-            <a:off x="5945516" y="5019841"/>
+            <a:off x="5945516" y="3499038"/>
             <a:ext cx="1210823" cy="307777"/>
           </a:xfrm>
           <a:prstGeom prst="rect">
@@ -3887,7 +3887,7 @@
         </p:nvCxnSpPr>
         <p:spPr>
           <a:xfrm flipH="1">
-            <a:off x="5603984" y="4869950"/>
+            <a:off x="5603984" y="3349147"/>
             <a:ext cx="1557006" cy="0"/>
           </a:xfrm>
           <a:prstGeom prst="straightConnector1">
@@ -3928,7 +3928,7 @@
         </p:nvCxnSpPr>
         <p:spPr>
           <a:xfrm flipV="1">
-            <a:off x="5608760" y="5019841"/>
+            <a:off x="5608760" y="3499038"/>
             <a:ext cx="1333155" cy="2513"/>
           </a:xfrm>
           <a:prstGeom prst="straightConnector1">
@@ -3967,7 +3967,7 @@
         </p:nvSpPr>
         <p:spPr>
           <a:xfrm>
-            <a:off x="9238467" y="4255387"/>
+            <a:off x="9238467" y="2134004"/>
             <a:ext cx="1668683" cy="951244"/>
           </a:xfrm>
           <a:prstGeom prst="rect">
@@ -4008,7 +4008,7 @@
                   <a:schemeClr val="tx1"/>
                 </a:solidFill>
               </a:rPr>
-              <a:t>DEV ACM</a:t>
+              <a:t>DEV ACM Alert Manager</a:t>
             </a:r>
           </a:p>
         </p:txBody>
@@ -4027,7 +4027,7 @@
         </p:nvGrpSpPr>
         <p:grpSpPr>
           <a:xfrm>
-            <a:off x="6941915" y="4233555"/>
+            <a:off x="6941915" y="2712752"/>
             <a:ext cx="1534050" cy="1581239"/>
             <a:chOff x="7967835" y="4746171"/>
             <a:chExt cx="1534050" cy="1581239"/>
@@ -4253,7 +4253,7 @@
         </p:nvSpPr>
         <p:spPr>
           <a:xfrm>
-            <a:off x="5944623" y="4228885"/>
+            <a:off x="5944623" y="2708082"/>
             <a:ext cx="1210822" cy="307777"/>
           </a:xfrm>
           <a:prstGeom prst="rect">
@@ -4325,7 +4325,7 @@
         </p:nvSpPr>
         <p:spPr>
           <a:xfrm>
-            <a:off x="5944623" y="4418567"/>
+            <a:off x="5944623" y="2897764"/>
             <a:ext cx="1210823" cy="307777"/>
           </a:xfrm>
           <a:prstGeom prst="rect">
@@ -4361,7 +4361,7 @@
         </p:nvSpPr>
         <p:spPr>
           <a:xfrm>
-            <a:off x="5944623" y="4584880"/>
+            <a:off x="5944623" y="3064077"/>
             <a:ext cx="1210823" cy="307777"/>
           </a:xfrm>
           <a:prstGeom prst="rect">
@@ -4440,12 +4440,138 @@
           </a:p>
         </p:txBody>
       </p:sp>
+      <p:cxnSp>
+        <p:nvCxnSpPr>
+          <p:cNvPr id="49" name="Straight Arrow Connector 48">
+            <a:extLst>
+              <a:ext uri="{FF2B5EF4-FFF2-40B4-BE49-F238E27FC236}">
+                <a16:creationId xmlns:a16="http://schemas.microsoft.com/office/drawing/2014/main" id="{F94709BF-81CC-4CC8-A889-EBC3FE864230}"/>
+              </a:ext>
+            </a:extLst>
+          </p:cNvPr>
+          <p:cNvCxnSpPr>
+            <a:cxnSpLocks/>
+          </p:cNvCxnSpPr>
+          <p:nvPr/>
+        </p:nvCxnSpPr>
+        <p:spPr>
+          <a:xfrm>
+            <a:off x="8475965" y="2809569"/>
+            <a:ext cx="762502" cy="0"/>
+          </a:xfrm>
+          <a:prstGeom prst="straightConnector1">
+            <a:avLst/>
+          </a:prstGeom>
+          <a:ln>
+            <a:tailEnd type="triangle"/>
+          </a:ln>
+        </p:spPr>
+        <p:style>
+          <a:lnRef idx="3">
+            <a:schemeClr val="dk1"/>
+          </a:lnRef>
+          <a:fillRef idx="0">
+            <a:schemeClr val="dk1"/>
+          </a:fillRef>
+          <a:effectRef idx="2">
+            <a:schemeClr val="dk1"/>
+          </a:effectRef>
+          <a:fontRef idx="minor">
+            <a:schemeClr val="tx1"/>
+          </a:fontRef>
+        </p:style>
+      </p:cxnSp>
+      <p:sp>
+        <p:nvSpPr>
+          <p:cNvPr id="54" name="TextBox 53">
+            <a:extLst>
+              <a:ext uri="{FF2B5EF4-FFF2-40B4-BE49-F238E27FC236}">
+                <a16:creationId xmlns:a16="http://schemas.microsoft.com/office/drawing/2014/main" id="{601471B6-8E72-4757-BCA4-7136B4D1C0A9}"/>
+              </a:ext>
+            </a:extLst>
+          </p:cNvPr>
+          <p:cNvSpPr txBox="1"/>
+          <p:nvPr/>
+        </p:nvSpPr>
+        <p:spPr>
+          <a:xfrm>
+            <a:off x="8440491" y="2293088"/>
+            <a:ext cx="839163" cy="523220"/>
+          </a:xfrm>
+          <a:prstGeom prst="rect">
+            <a:avLst/>
+          </a:prstGeom>
+          <a:noFill/>
+        </p:spPr>
+        <p:txBody>
+          <a:bodyPr wrap="square" rtlCol="0">
+            <a:spAutoFit/>
+          </a:bodyPr>
+          <a:lstStyle/>
+          <a:p>
+            <a:pPr algn="ctr"/>
+            <a:r>
+              <a:rPr lang="en-US" sz="1400" b="1" dirty="0"/>
+              <a:t>DEV-04</a:t>
+            </a:r>
+          </a:p>
+          <a:p>
+            <a:pPr algn="ctr"/>
+            <a:r>
+              <a:rPr lang="en-US" sz="1400" b="1" dirty="0"/>
+              <a:t>(PCD-04)</a:t>
+            </a:r>
+            <a:endParaRPr lang="en-US" sz="1600" b="1" dirty="0"/>
+          </a:p>
+        </p:txBody>
+      </p:sp>
+      <p:cxnSp>
+        <p:nvCxnSpPr>
+          <p:cNvPr id="48" name="Straight Arrow Connector 47">
+            <a:extLst>
+              <a:ext uri="{FF2B5EF4-FFF2-40B4-BE49-F238E27FC236}">
+                <a16:creationId xmlns:a16="http://schemas.microsoft.com/office/drawing/2014/main" id="{1E7A4FE6-F54F-40CD-99F7-CD1A5FB8E5C1}"/>
+              </a:ext>
+            </a:extLst>
+          </p:cNvPr>
+          <p:cNvCxnSpPr>
+            <a:cxnSpLocks/>
+          </p:cNvCxnSpPr>
+          <p:nvPr/>
+        </p:nvCxnSpPr>
+        <p:spPr>
+          <a:xfrm flipH="1">
+            <a:off x="8473681" y="2932919"/>
+            <a:ext cx="764786" cy="3064"/>
+          </a:xfrm>
+          <a:prstGeom prst="straightConnector1">
+            <a:avLst/>
+          </a:prstGeom>
+          <a:ln>
+            <a:tailEnd type="triangle"/>
+          </a:ln>
+        </p:spPr>
+        <p:style>
+          <a:lnRef idx="3">
+            <a:schemeClr val="dk1"/>
+          </a:lnRef>
+          <a:fillRef idx="0">
+            <a:schemeClr val="dk1"/>
+          </a:fillRef>
+          <a:effectRef idx="2">
+            <a:schemeClr val="dk1"/>
+          </a:effectRef>
+          <a:fontRef idx="minor">
+            <a:schemeClr val="tx1"/>
+          </a:fontRef>
+        </p:style>
+      </p:cxnSp>
       <p:grpSp>
         <p:nvGrpSpPr>
-          <p:cNvPr id="7" name="Group 6">
-            <a:extLst>
-              <a:ext uri="{FF2B5EF4-FFF2-40B4-BE49-F238E27FC236}">
-                <a16:creationId xmlns:a16="http://schemas.microsoft.com/office/drawing/2014/main" id="{E9FF61DA-F6E4-297C-25C6-B8B26C9B776B}"/>
+          <p:cNvPr id="19" name="Group 18">
+            <a:extLst>
+              <a:ext uri="{FF2B5EF4-FFF2-40B4-BE49-F238E27FC236}">
+                <a16:creationId xmlns:a16="http://schemas.microsoft.com/office/drawing/2014/main" id="{BA98F8A6-5D7B-E41E-A02E-87C588BF75D1}"/>
               </a:ext>
             </a:extLst>
           </p:cNvPr>
@@ -4454,176 +4580,12 @@
         </p:nvGrpSpPr>
         <p:grpSpPr>
           <a:xfrm>
-            <a:off x="8438139" y="4015476"/>
-            <a:ext cx="854574" cy="1592709"/>
-            <a:chOff x="8438139" y="4015476"/>
-            <a:chExt cx="854574" cy="1592709"/>
+            <a:off x="8432494" y="2916216"/>
+            <a:ext cx="839163" cy="493104"/>
+            <a:chOff x="8432494" y="2940281"/>
+            <a:chExt cx="839163" cy="493104"/>
           </a:xfrm>
         </p:grpSpPr>
-        <p:cxnSp>
-          <p:nvCxnSpPr>
-            <p:cNvPr id="49" name="Straight Arrow Connector 48">
-              <a:extLst>
-                <a:ext uri="{FF2B5EF4-FFF2-40B4-BE49-F238E27FC236}">
-                  <a16:creationId xmlns:a16="http://schemas.microsoft.com/office/drawing/2014/main" id="{F94709BF-81CC-4CC8-A889-EBC3FE864230}"/>
-                </a:ext>
-              </a:extLst>
-            </p:cNvPr>
-            <p:cNvCxnSpPr>
-              <a:cxnSpLocks/>
-            </p:cNvCxnSpPr>
-            <p:nvPr/>
-          </p:nvCxnSpPr>
-          <p:spPr>
-            <a:xfrm>
-              <a:off x="8475965" y="4537325"/>
-              <a:ext cx="762502" cy="0"/>
-            </a:xfrm>
-            <a:prstGeom prst="straightConnector1">
-              <a:avLst/>
-            </a:prstGeom>
-            <a:ln>
-              <a:tailEnd type="triangle"/>
-            </a:ln>
-          </p:spPr>
-          <p:style>
-            <a:lnRef idx="3">
-              <a:schemeClr val="dk1"/>
-            </a:lnRef>
-            <a:fillRef idx="0">
-              <a:schemeClr val="dk1"/>
-            </a:fillRef>
-            <a:effectRef idx="2">
-              <a:schemeClr val="dk1"/>
-            </a:effectRef>
-            <a:fontRef idx="minor">
-              <a:schemeClr val="tx1"/>
-            </a:fontRef>
-          </p:style>
-        </p:cxnSp>
-        <p:sp>
-          <p:nvSpPr>
-            <p:cNvPr id="54" name="TextBox 53">
-              <a:extLst>
-                <a:ext uri="{FF2B5EF4-FFF2-40B4-BE49-F238E27FC236}">
-                  <a16:creationId xmlns:a16="http://schemas.microsoft.com/office/drawing/2014/main" id="{601471B6-8E72-4757-BCA4-7136B4D1C0A9}"/>
-                </a:ext>
-              </a:extLst>
-            </p:cNvPr>
-            <p:cNvSpPr txBox="1"/>
-            <p:nvPr/>
-          </p:nvSpPr>
-          <p:spPr>
-            <a:xfrm>
-              <a:off x="8448413" y="4015476"/>
-              <a:ext cx="839163" cy="523220"/>
-            </a:xfrm>
-            <a:prstGeom prst="rect">
-              <a:avLst/>
-            </a:prstGeom>
-            <a:noFill/>
-          </p:spPr>
-          <p:txBody>
-            <a:bodyPr wrap="square" rtlCol="0">
-              <a:spAutoFit/>
-            </a:bodyPr>
-            <a:lstStyle/>
-            <a:p>
-              <a:pPr algn="ctr"/>
-              <a:r>
-                <a:rPr lang="en-US" sz="1400" b="1" dirty="0"/>
-                <a:t>DEV-04</a:t>
-              </a:r>
-            </a:p>
-            <a:p>
-              <a:pPr algn="ctr"/>
-              <a:r>
-                <a:rPr lang="en-US" sz="1400" b="1" dirty="0"/>
-                <a:t>(PCD-04)</a:t>
-              </a:r>
-              <a:endParaRPr lang="en-US" sz="1600" b="1" dirty="0"/>
-            </a:p>
-          </p:txBody>
-        </p:sp>
-        <p:cxnSp>
-          <p:nvCxnSpPr>
-            <p:cNvPr id="48" name="Straight Arrow Connector 47">
-              <a:extLst>
-                <a:ext uri="{FF2B5EF4-FFF2-40B4-BE49-F238E27FC236}">
-                  <a16:creationId xmlns:a16="http://schemas.microsoft.com/office/drawing/2014/main" id="{1E7A4FE6-F54F-40CD-99F7-CD1A5FB8E5C1}"/>
-                </a:ext>
-              </a:extLst>
-            </p:cNvPr>
-            <p:cNvCxnSpPr>
-              <a:cxnSpLocks/>
-              <a:stCxn id="43" idx="1"/>
-            </p:cNvCxnSpPr>
-            <p:nvPr/>
-          </p:nvCxnSpPr>
-          <p:spPr>
-            <a:xfrm flipH="1">
-              <a:off x="8475965" y="4731009"/>
-              <a:ext cx="762502" cy="10055"/>
-            </a:xfrm>
-            <a:prstGeom prst="straightConnector1">
-              <a:avLst/>
-            </a:prstGeom>
-            <a:ln>
-              <a:tailEnd type="triangle"/>
-            </a:ln>
-          </p:spPr>
-          <p:style>
-            <a:lnRef idx="3">
-              <a:schemeClr val="dk1"/>
-            </a:lnRef>
-            <a:fillRef idx="0">
-              <a:schemeClr val="dk1"/>
-            </a:fillRef>
-            <a:effectRef idx="2">
-              <a:schemeClr val="dk1"/>
-            </a:effectRef>
-            <a:fontRef idx="minor">
-              <a:schemeClr val="tx1"/>
-            </a:fontRef>
-          </p:style>
-        </p:cxnSp>
-        <p:sp>
-          <p:nvSpPr>
-            <p:cNvPr id="52" name="TextBox 51">
-              <a:extLst>
-                <a:ext uri="{FF2B5EF4-FFF2-40B4-BE49-F238E27FC236}">
-                  <a16:creationId xmlns:a16="http://schemas.microsoft.com/office/drawing/2014/main" id="{F7F0AA88-48E3-4D86-9BBE-854BB60CFB76}"/>
-                </a:ext>
-              </a:extLst>
-            </p:cNvPr>
-            <p:cNvSpPr txBox="1"/>
-            <p:nvPr/>
-          </p:nvSpPr>
-          <p:spPr>
-            <a:xfrm>
-              <a:off x="8438141" y="4740991"/>
-              <a:ext cx="839162" cy="307777"/>
-            </a:xfrm>
-            <a:prstGeom prst="rect">
-              <a:avLst/>
-            </a:prstGeom>
-            <a:noFill/>
-          </p:spPr>
-          <p:txBody>
-            <a:bodyPr wrap="square" rtlCol="0">
-              <a:spAutoFit/>
-            </a:bodyPr>
-            <a:lstStyle/>
-            <a:p>
-              <a:pPr algn="ctr"/>
-              <a:r>
-                <a:rPr lang="en-US" sz="1400" b="1" dirty="0"/>
-                <a:t>DEV-04</a:t>
-              </a:r>
-              <a:endParaRPr lang="en-US" sz="1600" b="1" dirty="0"/>
-            </a:p>
-          </p:txBody>
-        </p:sp>
         <p:sp>
           <p:nvSpPr>
             <p:cNvPr id="117" name="TextBox 116">
@@ -4638,7 +4600,7 @@
           </p:nvSpPr>
           <p:spPr>
             <a:xfrm>
-              <a:off x="8438139" y="4917876"/>
+              <a:off x="8432494" y="2940281"/>
               <a:ext cx="839163" cy="307777"/>
             </a:xfrm>
             <a:prstGeom prst="rect">
@@ -4663,41 +4625,6 @@
         </p:sp>
         <p:sp>
           <p:nvSpPr>
-            <p:cNvPr id="3" name="TextBox 2">
-              <a:extLst>
-                <a:ext uri="{FF2B5EF4-FFF2-40B4-BE49-F238E27FC236}">
-                  <a16:creationId xmlns:a16="http://schemas.microsoft.com/office/drawing/2014/main" id="{60CC9CE7-7524-5068-51AA-27780CDFE614}"/>
-                </a:ext>
-              </a:extLst>
-            </p:cNvPr>
-            <p:cNvSpPr txBox="1"/>
-            <p:nvPr/>
-          </p:nvSpPr>
-          <p:spPr>
-            <a:xfrm>
-              <a:off x="8453550" y="5137404"/>
-              <a:ext cx="839163" cy="307777"/>
-            </a:xfrm>
-            <a:prstGeom prst="rect">
-              <a:avLst/>
-            </a:prstGeom>
-            <a:noFill/>
-          </p:spPr>
-          <p:txBody>
-            <a:bodyPr wrap="square" rtlCol="0">
-              <a:spAutoFit/>
-            </a:bodyPr>
-            <a:lstStyle/>
-            <a:p>
-              <a:r>
-                <a:rPr lang="en-US" sz="1400" b="1" dirty="0"/>
-                <a:t>(PCD-04</a:t>
-              </a:r>
-            </a:p>
-          </p:txBody>
-        </p:sp>
-        <p:sp>
-          <p:nvSpPr>
             <p:cNvPr id="4" name="TextBox 3">
               <a:extLst>
                 <a:ext uri="{FF2B5EF4-FFF2-40B4-BE49-F238E27FC236}">
@@ -4710,7 +4637,7 @@
           </p:nvSpPr>
           <p:spPr>
             <a:xfrm>
-              <a:off x="8443276" y="5300408"/>
+              <a:off x="8432494" y="3125608"/>
               <a:ext cx="839163" cy="307777"/>
             </a:xfrm>
             <a:prstGeom prst="rect">
@@ -4727,7 +4654,288 @@
               <a:pPr algn="r"/>
               <a:r>
                 <a:rPr lang="en-US" sz="1400" b="1" dirty="0"/>
-                <a:t>PCD-05)</a:t>
+                <a:t>(PCD-05)</a:t>
+              </a:r>
+              <a:endParaRPr lang="en-US" sz="1600" b="1" dirty="0"/>
+            </a:p>
+          </p:txBody>
+        </p:sp>
+      </p:grpSp>
+      <p:sp>
+        <p:nvSpPr>
+          <p:cNvPr id="5" name="Rectangle 4">
+            <a:extLst>
+              <a:ext uri="{FF2B5EF4-FFF2-40B4-BE49-F238E27FC236}">
+                <a16:creationId xmlns:a16="http://schemas.microsoft.com/office/drawing/2014/main" id="{872F93F5-1C53-6245-AB2F-2A4BD41B4B21}"/>
+              </a:ext>
+            </a:extLst>
+          </p:cNvPr>
+          <p:cNvSpPr/>
+          <p:nvPr/>
+        </p:nvSpPr>
+        <p:spPr>
+          <a:xfrm>
+            <a:off x="9279654" y="3798646"/>
+            <a:ext cx="1668683" cy="951244"/>
+          </a:xfrm>
+          <a:prstGeom prst="rect">
+            <a:avLst/>
+          </a:prstGeom>
+          <a:noFill/>
+          <a:ln w="12700">
+            <a:solidFill>
+              <a:schemeClr val="tx1"/>
+            </a:solidFill>
+            <a:prstDash val="dash"/>
+          </a:ln>
+        </p:spPr>
+        <p:style>
+          <a:lnRef idx="2">
+            <a:schemeClr val="accent1">
+              <a:shade val="50000"/>
+            </a:schemeClr>
+          </a:lnRef>
+          <a:fillRef idx="1">
+            <a:schemeClr val="accent1"/>
+          </a:fillRef>
+          <a:effectRef idx="0">
+            <a:schemeClr val="accent1"/>
+          </a:effectRef>
+          <a:fontRef idx="minor">
+            <a:schemeClr val="lt1"/>
+          </a:fontRef>
+        </p:style>
+        <p:txBody>
+          <a:bodyPr rtlCol="0" anchor="ctr" anchorCtr="0"/>
+          <a:lstStyle/>
+          <a:p>
+            <a:pPr algn="ctr"/>
+            <a:r>
+              <a:rPr lang="en-US" dirty="0">
+                <a:solidFill>
+                  <a:schemeClr val="tx1"/>
+                </a:solidFill>
+              </a:rPr>
+              <a:t>DEV ACM Alert Reporter</a:t>
+            </a:r>
+          </a:p>
+        </p:txBody>
+      </p:sp>
+      <p:cxnSp>
+        <p:nvCxnSpPr>
+          <p:cNvPr id="6" name="Straight Arrow Connector 5">
+            <a:extLst>
+              <a:ext uri="{FF2B5EF4-FFF2-40B4-BE49-F238E27FC236}">
+                <a16:creationId xmlns:a16="http://schemas.microsoft.com/office/drawing/2014/main" id="{72C28437-6044-6B5B-7C45-D311F90E4855}"/>
+              </a:ext>
+            </a:extLst>
+          </p:cNvPr>
+          <p:cNvCxnSpPr>
+            <a:cxnSpLocks/>
+          </p:cNvCxnSpPr>
+          <p:nvPr/>
+        </p:nvCxnSpPr>
+        <p:spPr>
+          <a:xfrm>
+            <a:off x="8501159" y="4209698"/>
+            <a:ext cx="762502" cy="0"/>
+          </a:xfrm>
+          <a:prstGeom prst="straightConnector1">
+            <a:avLst/>
+          </a:prstGeom>
+          <a:ln>
+            <a:tailEnd type="triangle"/>
+          </a:ln>
+        </p:spPr>
+        <p:style>
+          <a:lnRef idx="3">
+            <a:schemeClr val="dk1"/>
+          </a:lnRef>
+          <a:fillRef idx="0">
+            <a:schemeClr val="dk1"/>
+          </a:fillRef>
+          <a:effectRef idx="2">
+            <a:schemeClr val="dk1"/>
+          </a:effectRef>
+          <a:fontRef idx="minor">
+            <a:schemeClr val="tx1"/>
+          </a:fontRef>
+        </p:style>
+      </p:cxnSp>
+      <p:cxnSp>
+        <p:nvCxnSpPr>
+          <p:cNvPr id="8" name="Straight Arrow Connector 7">
+            <a:extLst>
+              <a:ext uri="{FF2B5EF4-FFF2-40B4-BE49-F238E27FC236}">
+                <a16:creationId xmlns:a16="http://schemas.microsoft.com/office/drawing/2014/main" id="{207B84E6-4D06-29C7-2689-F5D8915EB914}"/>
+              </a:ext>
+            </a:extLst>
+          </p:cNvPr>
+          <p:cNvCxnSpPr>
+            <a:cxnSpLocks/>
+          </p:cNvCxnSpPr>
+          <p:nvPr/>
+        </p:nvCxnSpPr>
+        <p:spPr>
+          <a:xfrm flipH="1">
+            <a:off x="8488562" y="4110690"/>
+            <a:ext cx="749905" cy="0"/>
+          </a:xfrm>
+          <a:prstGeom prst="straightConnector1">
+            <a:avLst/>
+          </a:prstGeom>
+          <a:ln>
+            <a:tailEnd type="triangle"/>
+          </a:ln>
+        </p:spPr>
+        <p:style>
+          <a:lnRef idx="3">
+            <a:schemeClr val="dk1"/>
+          </a:lnRef>
+          <a:fillRef idx="0">
+            <a:schemeClr val="dk1"/>
+          </a:fillRef>
+          <a:effectRef idx="2">
+            <a:schemeClr val="dk1"/>
+          </a:effectRef>
+          <a:fontRef idx="minor">
+            <a:schemeClr val="tx1"/>
+          </a:fontRef>
+        </p:style>
+      </p:cxnSp>
+      <p:sp>
+        <p:nvSpPr>
+          <p:cNvPr id="11" name="TextBox 10">
+            <a:extLst>
+              <a:ext uri="{FF2B5EF4-FFF2-40B4-BE49-F238E27FC236}">
+                <a16:creationId xmlns:a16="http://schemas.microsoft.com/office/drawing/2014/main" id="{2763198F-388C-A720-F484-72E70CC17FC1}"/>
+              </a:ext>
+            </a:extLst>
+          </p:cNvPr>
+          <p:cNvSpPr txBox="1"/>
+          <p:nvPr/>
+        </p:nvSpPr>
+        <p:spPr>
+          <a:xfrm>
+            <a:off x="8473681" y="3597488"/>
+            <a:ext cx="839163" cy="523220"/>
+          </a:xfrm>
+          <a:prstGeom prst="rect">
+            <a:avLst/>
+          </a:prstGeom>
+          <a:noFill/>
+        </p:spPr>
+        <p:txBody>
+          <a:bodyPr wrap="square" rtlCol="0">
+            <a:spAutoFit/>
+          </a:bodyPr>
+          <a:lstStyle/>
+          <a:p>
+            <a:pPr algn="ctr"/>
+            <a:r>
+              <a:rPr lang="en-US" sz="1400" b="1" dirty="0"/>
+              <a:t>DEV-04</a:t>
+            </a:r>
+          </a:p>
+          <a:p>
+            <a:pPr algn="ctr"/>
+            <a:r>
+              <a:rPr lang="en-US" sz="1400" b="1" dirty="0"/>
+              <a:t>(PCD-04)</a:t>
+            </a:r>
+            <a:endParaRPr lang="en-US" sz="1600" b="1" dirty="0"/>
+          </a:p>
+        </p:txBody>
+      </p:sp>
+      <p:grpSp>
+        <p:nvGrpSpPr>
+          <p:cNvPr id="21" name="Group 20">
+            <a:extLst>
+              <a:ext uri="{FF2B5EF4-FFF2-40B4-BE49-F238E27FC236}">
+                <a16:creationId xmlns:a16="http://schemas.microsoft.com/office/drawing/2014/main" id="{F26F023C-2C4A-F2AA-E382-330F827C5C6A}"/>
+              </a:ext>
+            </a:extLst>
+          </p:cNvPr>
+          <p:cNvGrpSpPr/>
+          <p:nvPr/>
+        </p:nvGrpSpPr>
+        <p:grpSpPr>
+          <a:xfrm>
+            <a:off x="8432494" y="4188747"/>
+            <a:ext cx="839163" cy="493104"/>
+            <a:chOff x="8432494" y="2940281"/>
+            <a:chExt cx="839163" cy="493104"/>
+          </a:xfrm>
+        </p:grpSpPr>
+        <p:sp>
+          <p:nvSpPr>
+            <p:cNvPr id="22" name="TextBox 21">
+              <a:extLst>
+                <a:ext uri="{FF2B5EF4-FFF2-40B4-BE49-F238E27FC236}">
+                  <a16:creationId xmlns:a16="http://schemas.microsoft.com/office/drawing/2014/main" id="{AE4A003F-BC59-7C9E-E566-98079715E840}"/>
+                </a:ext>
+              </a:extLst>
+            </p:cNvPr>
+            <p:cNvSpPr txBox="1"/>
+            <p:nvPr/>
+          </p:nvSpPr>
+          <p:spPr>
+            <a:xfrm>
+              <a:off x="8432494" y="2940281"/>
+              <a:ext cx="839163" cy="307777"/>
+            </a:xfrm>
+            <a:prstGeom prst="rect">
+              <a:avLst/>
+            </a:prstGeom>
+            <a:noFill/>
+          </p:spPr>
+          <p:txBody>
+            <a:bodyPr wrap="square" rtlCol="0">
+              <a:spAutoFit/>
+            </a:bodyPr>
+            <a:lstStyle/>
+            <a:p>
+              <a:pPr algn="ctr"/>
+              <a:r>
+                <a:rPr lang="en-US" sz="1400" b="1" dirty="0"/>
+                <a:t>DEV-05</a:t>
+              </a:r>
+              <a:endParaRPr lang="en-US" sz="1600" b="1" dirty="0"/>
+            </a:p>
+          </p:txBody>
+        </p:sp>
+        <p:sp>
+          <p:nvSpPr>
+            <p:cNvPr id="23" name="TextBox 22">
+              <a:extLst>
+                <a:ext uri="{FF2B5EF4-FFF2-40B4-BE49-F238E27FC236}">
+                  <a16:creationId xmlns:a16="http://schemas.microsoft.com/office/drawing/2014/main" id="{6EDBFEA0-B376-29D2-F9FC-A55F81AAC3A4}"/>
+                </a:ext>
+              </a:extLst>
+            </p:cNvPr>
+            <p:cNvSpPr txBox="1"/>
+            <p:nvPr/>
+          </p:nvSpPr>
+          <p:spPr>
+            <a:xfrm>
+              <a:off x="8432494" y="3125608"/>
+              <a:ext cx="839163" cy="307777"/>
+            </a:xfrm>
+            <a:prstGeom prst="rect">
+              <a:avLst/>
+            </a:prstGeom>
+            <a:noFill/>
+          </p:spPr>
+          <p:txBody>
+            <a:bodyPr wrap="square" rtlCol="0">
+              <a:spAutoFit/>
+            </a:bodyPr>
+            <a:lstStyle/>
+            <a:p>
+              <a:pPr algn="r"/>
+              <a:r>
+                <a:rPr lang="en-US" sz="1400" b="1" dirty="0"/>
+                <a:t>(PCD-05)</a:t>
               </a:r>
               <a:endParaRPr lang="en-US" sz="1600" b="1" dirty="0"/>
             </a:p>

</xml_diff>